<commit_message>
refactor: Clean up whitespace and improve code readability in ppt_extractor.py
- Removed unnecessary blank lines and adjusted indentation for better readability.
- Enhanced exception handling messages for clarity.
- Added comprehensive attribute checks for shape properties to prevent potential errors during extraction.

This refactor improves the overall structure and maintainability of the PPTExtractor class.
</commit_message>
<xml_diff>
--- a/examples/extract/sample1-1.pptx
+++ b/examples/extract/sample1-1.pptx
@@ -21,18 +21,11 @@
       <p:boldItalic r:id="rId7"/>
     </p:embeddedFont>
     <p:embeddedFont>
-      <p:font typeface="Fira Sans Condensed SemiBold" panose="020F0502020204030204" pitchFamily="34" charset="0"/>
+      <p:font typeface="Roboto" panose="02000000000000000000" pitchFamily="2" charset="0"/>
       <p:regular r:id="rId8"/>
       <p:bold r:id="rId9"/>
       <p:italic r:id="rId10"/>
       <p:boldItalic r:id="rId11"/>
-    </p:embeddedFont>
-    <p:embeddedFont>
-      <p:font typeface="Roboto" panose="02000000000000000000" pitchFamily="2" charset="0"/>
-      <p:regular r:id="rId12"/>
-      <p:bold r:id="rId13"/>
-      <p:italic r:id="rId14"/>
-      <p:boldItalic r:id="rId15"/>
     </p:embeddedFont>
   </p:embeddedFontLst>
   <p:defaultTextStyle>
@@ -264,6 +257,11 @@
       </a:defRPr>
     </a:lvl9pPr>
   </p:defaultTextStyle>
+  <p:extLst>
+    <p:ext uri="{EFAFB233-063F-42B5-8137-9DF3F51BA10A}">
+      <p15:sldGuideLst xmlns:p15="http://schemas.microsoft.com/office/powerpoint/2012/main"/>
+    </p:ext>
+  </p:extLst>
 </p:presentation>
 </file>
 
@@ -5227,207 +5225,6 @@
       </p:grpSpPr>
       <p:sp>
         <p:nvSpPr>
-          <p:cNvPr id="55" name="Google Shape;55;p15"/>
-          <p:cNvSpPr/>
-          <p:nvPr/>
-        </p:nvSpPr>
-        <p:spPr>
-          <a:xfrm>
-            <a:off x="457198" y="411475"/>
-            <a:ext cx="4305240" cy="5400478"/>
-          </a:xfrm>
-          <a:custGeom>
-            <a:avLst/>
-            <a:gdLst/>
-            <a:ahLst/>
-            <a:cxnLst/>
-            <a:rect l="l" t="t" r="r" b="b"/>
-            <a:pathLst>
-              <a:path w="68405" h="85807" extrusionOk="0">
-                <a:moveTo>
-                  <a:pt x="0" y="11543"/>
-                </a:moveTo>
-                <a:lnTo>
-                  <a:pt x="0" y="85807"/>
-                </a:lnTo>
-                <a:lnTo>
-                  <a:pt x="68405" y="85807"/>
-                </a:lnTo>
-                <a:lnTo>
-                  <a:pt x="68405" y="0"/>
-                </a:lnTo>
-                <a:lnTo>
-                  <a:pt x="11566" y="18"/>
-                </a:lnTo>
-                <a:close/>
-              </a:path>
-            </a:pathLst>
-          </a:custGeom>
-          <a:solidFill>
-            <a:srgbClr val="EFEFEF"/>
-          </a:solidFill>
-          <a:ln>
-            <a:noFill/>
-          </a:ln>
-        </p:spPr>
-        <p:txBody>
-          <a:bodyPr/>
-          <a:lstStyle/>
-          <a:p>
-            <a:endParaRPr lang="en-KR"/>
-          </a:p>
-        </p:txBody>
-      </p:sp>
-      <p:sp>
-        <p:nvSpPr>
-          <p:cNvPr id="56" name="Google Shape;56;p15"/>
-          <p:cNvSpPr txBox="1">
-            <a:spLocks noGrp="1"/>
-          </p:cNvSpPr>
-          <p:nvPr>
-            <p:ph type="subTitle" idx="1"/>
-          </p:nvPr>
-        </p:nvSpPr>
-        <p:spPr>
-          <a:xfrm>
-            <a:off x="5032425" y="3493438"/>
-            <a:ext cx="3654300" cy="405600"/>
-          </a:xfrm>
-          <a:prstGeom prst="rect">
-            <a:avLst/>
-          </a:prstGeom>
-        </p:spPr>
-        <p:txBody>
-          <a:bodyPr spcFirstLastPara="1" wrap="square" lIns="91425" tIns="91425" rIns="91425" bIns="91425" anchor="t" anchorCtr="0">
-            <a:noAutofit/>
-          </a:bodyPr>
-          <a:lstStyle/>
-          <a:p>
-            <a:pPr marL="0" lvl="0" indent="0" algn="r" rtl="0">
-              <a:spcBef>
-                <a:spcPts val="0"/>
-              </a:spcBef>
-              <a:spcAft>
-                <a:spcPts val="1600"/>
-              </a:spcAft>
-              <a:buNone/>
-            </a:pPr>
-            <a:r>
-              <a:rPr lang="en" sz="1600"/>
-              <a:t>Here is where this template begins</a:t>
-            </a:r>
-            <a:endParaRPr sz="1600"/>
-          </a:p>
-        </p:txBody>
-      </p:sp>
-      <p:sp>
-        <p:nvSpPr>
-          <p:cNvPr id="57" name="Google Shape;57;p15"/>
-          <p:cNvSpPr txBox="1">
-            <a:spLocks noGrp="1"/>
-          </p:cNvSpPr>
-          <p:nvPr>
-            <p:ph type="ctrTitle"/>
-          </p:nvPr>
-        </p:nvSpPr>
-        <p:spPr>
-          <a:xfrm>
-            <a:off x="5032550" y="1244463"/>
-            <a:ext cx="3654300" cy="2172900"/>
-          </a:xfrm>
-          <a:prstGeom prst="rect">
-            <a:avLst/>
-          </a:prstGeom>
-        </p:spPr>
-        <p:txBody>
-          <a:bodyPr spcFirstLastPara="1" wrap="square" lIns="91425" tIns="91425" rIns="91425" bIns="91425" anchor="ctr" anchorCtr="0">
-            <a:noAutofit/>
-          </a:bodyPr>
-          <a:lstStyle/>
-          <a:p>
-            <a:pPr marL="0" lvl="0" indent="0" algn="r" rtl="0">
-              <a:spcBef>
-                <a:spcPts val="0"/>
-              </a:spcBef>
-              <a:spcAft>
-                <a:spcPts val="0"/>
-              </a:spcAft>
-              <a:buNone/>
-            </a:pPr>
-            <a:r>
-              <a:rPr lang="en" sz="5000" b="0">
-                <a:latin typeface="Fira Sans Condensed SemiBold"/>
-                <a:ea typeface="Fira Sans Condensed SemiBold"/>
-                <a:cs typeface="Fira Sans Condensed SemiBold"/>
-                <a:sym typeface="Fira Sans Condensed SemiBold"/>
-              </a:rPr>
-              <a:t>Design Elements Infographics</a:t>
-            </a:r>
-            <a:endParaRPr sz="5000" b="0">
-              <a:latin typeface="Fira Sans Condensed SemiBold"/>
-              <a:ea typeface="Fira Sans Condensed SemiBold"/>
-              <a:cs typeface="Fira Sans Condensed SemiBold"/>
-              <a:sym typeface="Fira Sans Condensed SemiBold"/>
-            </a:endParaRPr>
-          </a:p>
-        </p:txBody>
-      </p:sp>
-      <p:sp>
-        <p:nvSpPr>
-          <p:cNvPr id="58" name="Google Shape;58;p15"/>
-          <p:cNvSpPr/>
-          <p:nvPr/>
-        </p:nvSpPr>
-        <p:spPr>
-          <a:xfrm>
-            <a:off x="457198" y="411475"/>
-            <a:ext cx="726493" cy="726493"/>
-          </a:xfrm>
-          <a:custGeom>
-            <a:avLst/>
-            <a:gdLst/>
-            <a:ahLst/>
-            <a:cxnLst/>
-            <a:rect l="l" t="t" r="r" b="b"/>
-            <a:pathLst>
-              <a:path w="11367" h="11367" extrusionOk="0">
-                <a:moveTo>
-                  <a:pt x="0" y="11367"/>
-                </a:moveTo>
-                <a:lnTo>
-                  <a:pt x="11367" y="0"/>
-                </a:lnTo>
-                <a:lnTo>
-                  <a:pt x="11367" y="11367"/>
-                </a:lnTo>
-                <a:close/>
-              </a:path>
-            </a:pathLst>
-          </a:custGeom>
-          <a:solidFill>
-            <a:srgbClr val="D9D9D9"/>
-          </a:solidFill>
-          <a:ln>
-            <a:noFill/>
-          </a:ln>
-          <a:effectLst>
-            <a:outerShdw blurRad="71438" dist="19050" dir="2640000" algn="bl" rotWithShape="0">
-              <a:srgbClr val="000000">
-                <a:alpha val="25000"/>
-              </a:srgbClr>
-            </a:outerShdw>
-          </a:effectLst>
-        </p:spPr>
-        <p:txBody>
-          <a:bodyPr/>
-          <a:lstStyle/>
-          <a:p>
-            <a:endParaRPr lang="en-KR"/>
-          </a:p>
-        </p:txBody>
-      </p:sp>
-      <p:sp>
-        <p:nvSpPr>
           <p:cNvPr id="59" name="Google Shape;59;p15"/>
           <p:cNvSpPr/>
           <p:nvPr/>
@@ -5463,452 +5260,6 @@
                 </a:cubicBezTo>
                 <a:lnTo>
                   <a:pt x="59990" y="0"/>
-                </a:lnTo>
-                <a:close/>
-              </a:path>
-            </a:pathLst>
-          </a:custGeom>
-          <a:solidFill>
-            <a:schemeClr val="accent1"/>
-          </a:solidFill>
-          <a:ln>
-            <a:noFill/>
-          </a:ln>
-        </p:spPr>
-        <p:txBody>
-          <a:bodyPr spcFirstLastPara="1" wrap="square" lIns="91425" tIns="91425" rIns="91425" bIns="91425" anchor="ctr" anchorCtr="0">
-            <a:noAutofit/>
-          </a:bodyPr>
-          <a:lstStyle/>
-          <a:p>
-            <a:pPr marL="0" lvl="0" indent="0" algn="l" rtl="0">
-              <a:spcBef>
-                <a:spcPts val="0"/>
-              </a:spcBef>
-              <a:spcAft>
-                <a:spcPts val="0"/>
-              </a:spcAft>
-              <a:buNone/>
-            </a:pPr>
-            <a:endParaRPr/>
-          </a:p>
-        </p:txBody>
-      </p:sp>
-      <p:sp>
-        <p:nvSpPr>
-          <p:cNvPr id="60" name="Google Shape;60;p15"/>
-          <p:cNvSpPr/>
-          <p:nvPr/>
-        </p:nvSpPr>
-        <p:spPr>
-          <a:xfrm>
-            <a:off x="2606911" y="992700"/>
-            <a:ext cx="917697" cy="917697"/>
-          </a:xfrm>
-          <a:custGeom>
-            <a:avLst/>
-            <a:gdLst/>
-            <a:ahLst/>
-            <a:cxnLst/>
-            <a:rect l="l" t="t" r="r" b="b"/>
-            <a:pathLst>
-              <a:path w="59990" h="59990" extrusionOk="0">
-                <a:moveTo>
-                  <a:pt x="0" y="0"/>
-                </a:moveTo>
-                <a:lnTo>
-                  <a:pt x="0" y="37693"/>
-                </a:lnTo>
-                <a:cubicBezTo>
-                  <a:pt x="12298" y="37693"/>
-                  <a:pt x="22196" y="47691"/>
-                  <a:pt x="22196" y="59989"/>
-                </a:cubicBezTo>
-                <a:lnTo>
-                  <a:pt x="59990" y="59989"/>
-                </a:lnTo>
-                <a:cubicBezTo>
-                  <a:pt x="59990" y="26870"/>
-                  <a:pt x="33119" y="0"/>
-                  <a:pt x="0" y="0"/>
-                </a:cubicBezTo>
-                <a:close/>
-              </a:path>
-            </a:pathLst>
-          </a:custGeom>
-          <a:solidFill>
-            <a:schemeClr val="accent4"/>
-          </a:solidFill>
-          <a:ln>
-            <a:noFill/>
-          </a:ln>
-        </p:spPr>
-        <p:txBody>
-          <a:bodyPr spcFirstLastPara="1" wrap="square" lIns="91425" tIns="91425" rIns="91425" bIns="91425" anchor="ctr" anchorCtr="0">
-            <a:noAutofit/>
-          </a:bodyPr>
-          <a:lstStyle/>
-          <a:p>
-            <a:pPr marL="0" lvl="0" indent="0" algn="l" rtl="0">
-              <a:spcBef>
-                <a:spcPts val="0"/>
-              </a:spcBef>
-              <a:spcAft>
-                <a:spcPts val="0"/>
-              </a:spcAft>
-              <a:buNone/>
-            </a:pPr>
-            <a:endParaRPr/>
-          </a:p>
-        </p:txBody>
-      </p:sp>
-      <p:sp>
-        <p:nvSpPr>
-          <p:cNvPr id="61" name="Google Shape;61;p15"/>
-          <p:cNvSpPr/>
-          <p:nvPr/>
-        </p:nvSpPr>
-        <p:spPr>
-          <a:xfrm>
-            <a:off x="1695000" y="1904593"/>
-            <a:ext cx="917712" cy="916167"/>
-          </a:xfrm>
-          <a:custGeom>
-            <a:avLst/>
-            <a:gdLst/>
-            <a:ahLst/>
-            <a:cxnLst/>
-            <a:rect l="l" t="t" r="r" b="b"/>
-            <a:pathLst>
-              <a:path w="59991" h="59890" extrusionOk="0">
-                <a:moveTo>
-                  <a:pt x="1" y="0"/>
-                </a:moveTo>
-                <a:cubicBezTo>
-                  <a:pt x="1" y="33019"/>
-                  <a:pt x="26871" y="59889"/>
-                  <a:pt x="59990" y="59889"/>
-                </a:cubicBezTo>
-                <a:lnTo>
-                  <a:pt x="59990" y="22196"/>
-                </a:lnTo>
-                <a:cubicBezTo>
-                  <a:pt x="47717" y="22196"/>
-                  <a:pt x="37819" y="12198"/>
-                  <a:pt x="37819" y="0"/>
-                </a:cubicBezTo>
-                <a:close/>
-              </a:path>
-            </a:pathLst>
-          </a:custGeom>
-          <a:solidFill>
-            <a:schemeClr val="accent2"/>
-          </a:solidFill>
-          <a:ln>
-            <a:noFill/>
-          </a:ln>
-        </p:spPr>
-        <p:txBody>
-          <a:bodyPr spcFirstLastPara="1" wrap="square" lIns="91425" tIns="91425" rIns="91425" bIns="91425" anchor="ctr" anchorCtr="0">
-            <a:noAutofit/>
-          </a:bodyPr>
-          <a:lstStyle/>
-          <a:p>
-            <a:pPr marL="0" lvl="0" indent="0" algn="l" rtl="0">
-              <a:spcBef>
-                <a:spcPts val="0"/>
-              </a:spcBef>
-              <a:spcAft>
-                <a:spcPts val="0"/>
-              </a:spcAft>
-              <a:buNone/>
-            </a:pPr>
-            <a:endParaRPr/>
-          </a:p>
-        </p:txBody>
-      </p:sp>
-      <p:sp>
-        <p:nvSpPr>
-          <p:cNvPr id="62" name="Google Shape;62;p15"/>
-          <p:cNvSpPr/>
-          <p:nvPr/>
-        </p:nvSpPr>
-        <p:spPr>
-          <a:xfrm>
-            <a:off x="2606911" y="1904593"/>
-            <a:ext cx="917697" cy="916167"/>
-          </a:xfrm>
-          <a:custGeom>
-            <a:avLst/>
-            <a:gdLst/>
-            <a:ahLst/>
-            <a:cxnLst/>
-            <a:rect l="l" t="t" r="r" b="b"/>
-            <a:pathLst>
-              <a:path w="59990" h="59890" extrusionOk="0">
-                <a:moveTo>
-                  <a:pt x="22196" y="0"/>
-                </a:moveTo>
-                <a:cubicBezTo>
-                  <a:pt x="22196" y="12198"/>
-                  <a:pt x="12298" y="22196"/>
-                  <a:pt x="0" y="22196"/>
-                </a:cubicBezTo>
-                <a:lnTo>
-                  <a:pt x="0" y="59889"/>
-                </a:lnTo>
-                <a:cubicBezTo>
-                  <a:pt x="33119" y="59889"/>
-                  <a:pt x="59990" y="33019"/>
-                  <a:pt x="59990" y="0"/>
-                </a:cubicBezTo>
-                <a:close/>
-              </a:path>
-            </a:pathLst>
-          </a:custGeom>
-          <a:solidFill>
-            <a:schemeClr val="accent3"/>
-          </a:solidFill>
-          <a:ln>
-            <a:noFill/>
-          </a:ln>
-        </p:spPr>
-        <p:txBody>
-          <a:bodyPr spcFirstLastPara="1" wrap="square" lIns="91425" tIns="91425" rIns="91425" bIns="91425" anchor="ctr" anchorCtr="0">
-            <a:noAutofit/>
-          </a:bodyPr>
-          <a:lstStyle/>
-          <a:p>
-            <a:pPr marL="0" lvl="0" indent="0" algn="l" rtl="0">
-              <a:spcBef>
-                <a:spcPts val="0"/>
-              </a:spcBef>
-              <a:spcAft>
-                <a:spcPts val="0"/>
-              </a:spcAft>
-              <a:buNone/>
-            </a:pPr>
-            <a:endParaRPr/>
-          </a:p>
-        </p:txBody>
-      </p:sp>
-      <p:sp>
-        <p:nvSpPr>
-          <p:cNvPr id="63" name="Google Shape;63;p15"/>
-          <p:cNvSpPr/>
-          <p:nvPr/>
-        </p:nvSpPr>
-        <p:spPr>
-          <a:xfrm flipH="1">
-            <a:off x="3189187" y="3454202"/>
-            <a:ext cx="335413" cy="980442"/>
-          </a:xfrm>
-          <a:custGeom>
-            <a:avLst/>
-            <a:gdLst/>
-            <a:ahLst/>
-            <a:cxnLst/>
-            <a:rect l="l" t="t" r="r" b="b"/>
-            <a:pathLst>
-              <a:path w="2302" h="14545" extrusionOk="0">
-                <a:moveTo>
-                  <a:pt x="0" y="1"/>
-                </a:moveTo>
-                <a:lnTo>
-                  <a:pt x="0" y="14545"/>
-                </a:lnTo>
-                <a:lnTo>
-                  <a:pt x="2302" y="14545"/>
-                </a:lnTo>
-                <a:lnTo>
-                  <a:pt x="2302" y="1"/>
-                </a:lnTo>
-                <a:close/>
-              </a:path>
-            </a:pathLst>
-          </a:custGeom>
-          <a:solidFill>
-            <a:schemeClr val="accent5"/>
-          </a:solidFill>
-          <a:ln>
-            <a:noFill/>
-          </a:ln>
-        </p:spPr>
-        <p:txBody>
-          <a:bodyPr spcFirstLastPara="1" wrap="square" lIns="91425" tIns="91425" rIns="91425" bIns="91425" anchor="ctr" anchorCtr="0">
-            <a:noAutofit/>
-          </a:bodyPr>
-          <a:lstStyle/>
-          <a:p>
-            <a:pPr marL="0" lvl="0" indent="0" algn="l" rtl="0">
-              <a:spcBef>
-                <a:spcPts val="0"/>
-              </a:spcBef>
-              <a:spcAft>
-                <a:spcPts val="0"/>
-              </a:spcAft>
-              <a:buNone/>
-            </a:pPr>
-            <a:endParaRPr/>
-          </a:p>
-        </p:txBody>
-      </p:sp>
-      <p:sp>
-        <p:nvSpPr>
-          <p:cNvPr id="64" name="Google Shape;64;p15"/>
-          <p:cNvSpPr/>
-          <p:nvPr/>
-        </p:nvSpPr>
-        <p:spPr>
-          <a:xfrm flipH="1">
-            <a:off x="2691115" y="3150352"/>
-            <a:ext cx="335415" cy="1284290"/>
-          </a:xfrm>
-          <a:custGeom>
-            <a:avLst/>
-            <a:gdLst/>
-            <a:ahLst/>
-            <a:cxnLst/>
-            <a:rect l="l" t="t" r="r" b="b"/>
-            <a:pathLst>
-              <a:path w="2303" h="15812" extrusionOk="0">
-                <a:moveTo>
-                  <a:pt x="1" y="0"/>
-                </a:moveTo>
-                <a:lnTo>
-                  <a:pt x="1" y="15812"/>
-                </a:lnTo>
-                <a:lnTo>
-                  <a:pt x="2302" y="15812"/>
-                </a:lnTo>
-                <a:lnTo>
-                  <a:pt x="2302" y="0"/>
-                </a:lnTo>
-                <a:close/>
-              </a:path>
-            </a:pathLst>
-          </a:custGeom>
-          <a:solidFill>
-            <a:schemeClr val="accent4"/>
-          </a:solidFill>
-          <a:ln>
-            <a:noFill/>
-          </a:ln>
-        </p:spPr>
-        <p:txBody>
-          <a:bodyPr spcFirstLastPara="1" wrap="square" lIns="91425" tIns="91425" rIns="91425" bIns="91425" anchor="ctr" anchorCtr="0">
-            <a:noAutofit/>
-          </a:bodyPr>
-          <a:lstStyle/>
-          <a:p>
-            <a:pPr marL="0" lvl="0" indent="0" algn="l" rtl="0">
-              <a:spcBef>
-                <a:spcPts val="0"/>
-              </a:spcBef>
-              <a:spcAft>
-                <a:spcPts val="0"/>
-              </a:spcAft>
-              <a:buNone/>
-            </a:pPr>
-            <a:endParaRPr>
-              <a:solidFill>
-                <a:srgbClr val="FF8817"/>
-              </a:solidFill>
-            </a:endParaRPr>
-          </a:p>
-        </p:txBody>
-      </p:sp>
-      <p:sp>
-        <p:nvSpPr>
-          <p:cNvPr id="65" name="Google Shape;65;p15"/>
-          <p:cNvSpPr/>
-          <p:nvPr/>
-        </p:nvSpPr>
-        <p:spPr>
-          <a:xfrm flipH="1">
-            <a:off x="2193061" y="3814799"/>
-            <a:ext cx="335415" cy="617364"/>
-          </a:xfrm>
-          <a:custGeom>
-            <a:avLst/>
-            <a:gdLst/>
-            <a:ahLst/>
-            <a:cxnLst/>
-            <a:rect l="l" t="t" r="r" b="b"/>
-            <a:pathLst>
-              <a:path w="2303" h="11209" extrusionOk="0">
-                <a:moveTo>
-                  <a:pt x="1" y="0"/>
-                </a:moveTo>
-                <a:lnTo>
-                  <a:pt x="1" y="11208"/>
-                </a:lnTo>
-                <a:lnTo>
-                  <a:pt x="2302" y="11208"/>
-                </a:lnTo>
-                <a:lnTo>
-                  <a:pt x="2302" y="0"/>
-                </a:lnTo>
-                <a:close/>
-              </a:path>
-            </a:pathLst>
-          </a:custGeom>
-          <a:solidFill>
-            <a:schemeClr val="accent2"/>
-          </a:solidFill>
-          <a:ln>
-            <a:noFill/>
-          </a:ln>
-        </p:spPr>
-        <p:txBody>
-          <a:bodyPr spcFirstLastPara="1" wrap="square" lIns="91425" tIns="91425" rIns="91425" bIns="91425" anchor="ctr" anchorCtr="0">
-            <a:noAutofit/>
-          </a:bodyPr>
-          <a:lstStyle/>
-          <a:p>
-            <a:pPr marL="0" lvl="0" indent="0" algn="l" rtl="0">
-              <a:spcBef>
-                <a:spcPts val="0"/>
-              </a:spcBef>
-              <a:spcAft>
-                <a:spcPts val="0"/>
-              </a:spcAft>
-              <a:buNone/>
-            </a:pPr>
-            <a:endParaRPr/>
-          </a:p>
-        </p:txBody>
-      </p:sp>
-      <p:sp>
-        <p:nvSpPr>
-          <p:cNvPr id="66" name="Google Shape;66;p15"/>
-          <p:cNvSpPr/>
-          <p:nvPr/>
-        </p:nvSpPr>
-        <p:spPr>
-          <a:xfrm flipH="1">
-            <a:off x="1695000" y="3559980"/>
-            <a:ext cx="335415" cy="874591"/>
-          </a:xfrm>
-          <a:custGeom>
-            <a:avLst/>
-            <a:gdLst/>
-            <a:ahLst/>
-            <a:cxnLst/>
-            <a:rect l="l" t="t" r="r" b="b"/>
-            <a:pathLst>
-              <a:path w="2303" h="14545" extrusionOk="0">
-                <a:moveTo>
-                  <a:pt x="0" y="1"/>
-                </a:moveTo>
-                <a:lnTo>
-                  <a:pt x="0" y="14545"/>
-                </a:lnTo>
-                <a:lnTo>
-                  <a:pt x="2302" y="14545"/>
-                </a:lnTo>
-                <a:lnTo>
-                  <a:pt x="2302" y="1"/>
                 </a:lnTo>
                 <a:close/>
               </a:path>

</xml_diff>

<commit_message>
refactor: Remove debug print statements and update shape extraction properties
- Deleted unnecessary debug print statements from PPTExtractor to streamline output.
- Updated the modified date and revision number in sample1-1_properties.json for accuracy.
- Enhanced shape data extraction in sample1-1_shapes.json, increasing total shapes from 1 to 12.
- Removed backup PowerPoint file sample1-1-backup.pptx to clean up the directory.
- Updated slide1.xml to reflect changes in shape properties and structure.

This commit improves the clarity and accuracy of the shape extraction process while maintaining the integrity of the PowerPoint files.
</commit_message>
<xml_diff>
--- a/examples/extract/sample1-1.pptx
+++ b/examples/extract/sample1-1.pptx
@@ -21,11 +21,18 @@
       <p:boldItalic r:id="rId7"/>
     </p:embeddedFont>
     <p:embeddedFont>
-      <p:font typeface="Roboto" panose="02000000000000000000" pitchFamily="2" charset="0"/>
+      <p:font typeface="Fira Sans Condensed SemiBold" panose="020F0502020204030204" pitchFamily="34" charset="0"/>
       <p:regular r:id="rId8"/>
       <p:bold r:id="rId9"/>
       <p:italic r:id="rId10"/>
       <p:boldItalic r:id="rId11"/>
+    </p:embeddedFont>
+    <p:embeddedFont>
+      <p:font typeface="Roboto" panose="02000000000000000000" pitchFamily="2" charset="0"/>
+      <p:regular r:id="rId12"/>
+      <p:bold r:id="rId13"/>
+      <p:italic r:id="rId14"/>
+      <p:boldItalic r:id="rId15"/>
     </p:embeddedFont>
   </p:embeddedFontLst>
   <p:defaultTextStyle>
@@ -257,11 +264,6 @@
       </a:defRPr>
     </a:lvl9pPr>
   </p:defaultTextStyle>
-  <p:extLst>
-    <p:ext uri="{EFAFB233-063F-42B5-8137-9DF3F51BA10A}">
-      <p15:sldGuideLst xmlns:p15="http://schemas.microsoft.com/office/powerpoint/2012/main"/>
-    </p:ext>
-  </p:extLst>
 </p:presentation>
 </file>
 
@@ -5225,6 +5227,207 @@
       </p:grpSpPr>
       <p:sp>
         <p:nvSpPr>
+          <p:cNvPr id="55" name="Google Shape;55;p15"/>
+          <p:cNvSpPr/>
+          <p:nvPr/>
+        </p:nvSpPr>
+        <p:spPr>
+          <a:xfrm>
+            <a:off x="457198" y="411475"/>
+            <a:ext cx="4305240" cy="5400478"/>
+          </a:xfrm>
+          <a:custGeom>
+            <a:avLst/>
+            <a:gdLst/>
+            <a:ahLst/>
+            <a:cxnLst/>
+            <a:rect l="l" t="t" r="r" b="b"/>
+            <a:pathLst>
+              <a:path w="68405" h="85807" extrusionOk="0">
+                <a:moveTo>
+                  <a:pt x="0" y="11543"/>
+                </a:moveTo>
+                <a:lnTo>
+                  <a:pt x="0" y="85807"/>
+                </a:lnTo>
+                <a:lnTo>
+                  <a:pt x="68405" y="85807"/>
+                </a:lnTo>
+                <a:lnTo>
+                  <a:pt x="68405" y="0"/>
+                </a:lnTo>
+                <a:lnTo>
+                  <a:pt x="11566" y="18"/>
+                </a:lnTo>
+                <a:close/>
+              </a:path>
+            </a:pathLst>
+          </a:custGeom>
+          <a:solidFill>
+            <a:srgbClr val="EFEFEF"/>
+          </a:solidFill>
+          <a:ln>
+            <a:noFill/>
+          </a:ln>
+        </p:spPr>
+        <p:txBody>
+          <a:bodyPr/>
+          <a:lstStyle/>
+          <a:p>
+            <a:endParaRPr lang="en-KR"/>
+          </a:p>
+        </p:txBody>
+      </p:sp>
+      <p:sp>
+        <p:nvSpPr>
+          <p:cNvPr id="56" name="Google Shape;56;p15"/>
+          <p:cNvSpPr txBox="1">
+            <a:spLocks noGrp="1"/>
+          </p:cNvSpPr>
+          <p:nvPr>
+            <p:ph type="subTitle" idx="1"/>
+          </p:nvPr>
+        </p:nvSpPr>
+        <p:spPr>
+          <a:xfrm>
+            <a:off x="5032425" y="3493438"/>
+            <a:ext cx="3654300" cy="405600"/>
+          </a:xfrm>
+          <a:prstGeom prst="rect">
+            <a:avLst/>
+          </a:prstGeom>
+        </p:spPr>
+        <p:txBody>
+          <a:bodyPr spcFirstLastPara="1" wrap="square" lIns="91425" tIns="91425" rIns="91425" bIns="91425" anchor="t" anchorCtr="0">
+            <a:noAutofit/>
+          </a:bodyPr>
+          <a:lstStyle/>
+          <a:p>
+            <a:pPr marL="0" lvl="0" indent="0" algn="r" rtl="0">
+              <a:spcBef>
+                <a:spcPts val="0"/>
+              </a:spcBef>
+              <a:spcAft>
+                <a:spcPts val="1600"/>
+              </a:spcAft>
+              <a:buNone/>
+            </a:pPr>
+            <a:r>
+              <a:rPr lang="en" sz="1600"/>
+              <a:t>Here is where this template begins</a:t>
+            </a:r>
+            <a:endParaRPr sz="1600"/>
+          </a:p>
+        </p:txBody>
+      </p:sp>
+      <p:sp>
+        <p:nvSpPr>
+          <p:cNvPr id="57" name="Google Shape;57;p15"/>
+          <p:cNvSpPr txBox="1">
+            <a:spLocks noGrp="1"/>
+          </p:cNvSpPr>
+          <p:nvPr>
+            <p:ph type="ctrTitle"/>
+          </p:nvPr>
+        </p:nvSpPr>
+        <p:spPr>
+          <a:xfrm>
+            <a:off x="5032550" y="1244463"/>
+            <a:ext cx="3654300" cy="2172900"/>
+          </a:xfrm>
+          <a:prstGeom prst="rect">
+            <a:avLst/>
+          </a:prstGeom>
+        </p:spPr>
+        <p:txBody>
+          <a:bodyPr spcFirstLastPara="1" wrap="square" lIns="91425" tIns="91425" rIns="91425" bIns="91425" anchor="ctr" anchorCtr="0">
+            <a:noAutofit/>
+          </a:bodyPr>
+          <a:lstStyle/>
+          <a:p>
+            <a:pPr marL="0" lvl="0" indent="0" algn="r" rtl="0">
+              <a:spcBef>
+                <a:spcPts val="0"/>
+              </a:spcBef>
+              <a:spcAft>
+                <a:spcPts val="0"/>
+              </a:spcAft>
+              <a:buNone/>
+            </a:pPr>
+            <a:r>
+              <a:rPr lang="en" sz="5000" b="0">
+                <a:latin typeface="Fira Sans Condensed SemiBold"/>
+                <a:ea typeface="Fira Sans Condensed SemiBold"/>
+                <a:cs typeface="Fira Sans Condensed SemiBold"/>
+                <a:sym typeface="Fira Sans Condensed SemiBold"/>
+              </a:rPr>
+              <a:t>Design Elements Infographics</a:t>
+            </a:r>
+            <a:endParaRPr sz="5000" b="0">
+              <a:latin typeface="Fira Sans Condensed SemiBold"/>
+              <a:ea typeface="Fira Sans Condensed SemiBold"/>
+              <a:cs typeface="Fira Sans Condensed SemiBold"/>
+              <a:sym typeface="Fira Sans Condensed SemiBold"/>
+            </a:endParaRPr>
+          </a:p>
+        </p:txBody>
+      </p:sp>
+      <p:sp>
+        <p:nvSpPr>
+          <p:cNvPr id="58" name="Google Shape;58;p15"/>
+          <p:cNvSpPr/>
+          <p:nvPr/>
+        </p:nvSpPr>
+        <p:spPr>
+          <a:xfrm>
+            <a:off x="457198" y="411475"/>
+            <a:ext cx="726493" cy="726493"/>
+          </a:xfrm>
+          <a:custGeom>
+            <a:avLst/>
+            <a:gdLst/>
+            <a:ahLst/>
+            <a:cxnLst/>
+            <a:rect l="l" t="t" r="r" b="b"/>
+            <a:pathLst>
+              <a:path w="11367" h="11367" extrusionOk="0">
+                <a:moveTo>
+                  <a:pt x="0" y="11367"/>
+                </a:moveTo>
+                <a:lnTo>
+                  <a:pt x="11367" y="0"/>
+                </a:lnTo>
+                <a:lnTo>
+                  <a:pt x="11367" y="11367"/>
+                </a:lnTo>
+                <a:close/>
+              </a:path>
+            </a:pathLst>
+          </a:custGeom>
+          <a:solidFill>
+            <a:srgbClr val="D9D9D9"/>
+          </a:solidFill>
+          <a:ln>
+            <a:noFill/>
+          </a:ln>
+          <a:effectLst>
+            <a:outerShdw blurRad="71438" dist="19050" dir="2640000" algn="bl" rotWithShape="0">
+              <a:srgbClr val="000000">
+                <a:alpha val="25000"/>
+              </a:srgbClr>
+            </a:outerShdw>
+          </a:effectLst>
+        </p:spPr>
+        <p:txBody>
+          <a:bodyPr/>
+          <a:lstStyle/>
+          <a:p>
+            <a:endParaRPr lang="en-KR"/>
+          </a:p>
+        </p:txBody>
+      </p:sp>
+      <p:sp>
+        <p:nvSpPr>
           <p:cNvPr id="59" name="Google Shape;59;p15"/>
           <p:cNvSpPr/>
           <p:nvPr/>
@@ -5260,6 +5463,452 @@
                 </a:cubicBezTo>
                 <a:lnTo>
                   <a:pt x="59990" y="0"/>
+                </a:lnTo>
+                <a:close/>
+              </a:path>
+            </a:pathLst>
+          </a:custGeom>
+          <a:solidFill>
+            <a:schemeClr val="accent1"/>
+          </a:solidFill>
+          <a:ln>
+            <a:noFill/>
+          </a:ln>
+        </p:spPr>
+        <p:txBody>
+          <a:bodyPr spcFirstLastPara="1" wrap="square" lIns="91425" tIns="91425" rIns="91425" bIns="91425" anchor="ctr" anchorCtr="0">
+            <a:noAutofit/>
+          </a:bodyPr>
+          <a:lstStyle/>
+          <a:p>
+            <a:pPr marL="0" lvl="0" indent="0" algn="l" rtl="0">
+              <a:spcBef>
+                <a:spcPts val="0"/>
+              </a:spcBef>
+              <a:spcAft>
+                <a:spcPts val="0"/>
+              </a:spcAft>
+              <a:buNone/>
+            </a:pPr>
+            <a:endParaRPr/>
+          </a:p>
+        </p:txBody>
+      </p:sp>
+      <p:sp>
+        <p:nvSpPr>
+          <p:cNvPr id="60" name="Google Shape;60;p15"/>
+          <p:cNvSpPr/>
+          <p:nvPr/>
+        </p:nvSpPr>
+        <p:spPr>
+          <a:xfrm>
+            <a:off x="2606911" y="992700"/>
+            <a:ext cx="917697" cy="917697"/>
+          </a:xfrm>
+          <a:custGeom>
+            <a:avLst/>
+            <a:gdLst/>
+            <a:ahLst/>
+            <a:cxnLst/>
+            <a:rect l="l" t="t" r="r" b="b"/>
+            <a:pathLst>
+              <a:path w="59990" h="59990" extrusionOk="0">
+                <a:moveTo>
+                  <a:pt x="0" y="0"/>
+                </a:moveTo>
+                <a:lnTo>
+                  <a:pt x="0" y="37693"/>
+                </a:lnTo>
+                <a:cubicBezTo>
+                  <a:pt x="12298" y="37693"/>
+                  <a:pt x="22196" y="47691"/>
+                  <a:pt x="22196" y="59989"/>
+                </a:cubicBezTo>
+                <a:lnTo>
+                  <a:pt x="59990" y="59989"/>
+                </a:lnTo>
+                <a:cubicBezTo>
+                  <a:pt x="59990" y="26870"/>
+                  <a:pt x="33119" y="0"/>
+                  <a:pt x="0" y="0"/>
+                </a:cubicBezTo>
+                <a:close/>
+              </a:path>
+            </a:pathLst>
+          </a:custGeom>
+          <a:solidFill>
+            <a:schemeClr val="accent4"/>
+          </a:solidFill>
+          <a:ln>
+            <a:noFill/>
+          </a:ln>
+        </p:spPr>
+        <p:txBody>
+          <a:bodyPr spcFirstLastPara="1" wrap="square" lIns="91425" tIns="91425" rIns="91425" bIns="91425" anchor="ctr" anchorCtr="0">
+            <a:noAutofit/>
+          </a:bodyPr>
+          <a:lstStyle/>
+          <a:p>
+            <a:pPr marL="0" lvl="0" indent="0" algn="l" rtl="0">
+              <a:spcBef>
+                <a:spcPts val="0"/>
+              </a:spcBef>
+              <a:spcAft>
+                <a:spcPts val="0"/>
+              </a:spcAft>
+              <a:buNone/>
+            </a:pPr>
+            <a:endParaRPr/>
+          </a:p>
+        </p:txBody>
+      </p:sp>
+      <p:sp>
+        <p:nvSpPr>
+          <p:cNvPr id="61" name="Google Shape;61;p15"/>
+          <p:cNvSpPr/>
+          <p:nvPr/>
+        </p:nvSpPr>
+        <p:spPr>
+          <a:xfrm>
+            <a:off x="1695000" y="1904593"/>
+            <a:ext cx="917712" cy="916167"/>
+          </a:xfrm>
+          <a:custGeom>
+            <a:avLst/>
+            <a:gdLst/>
+            <a:ahLst/>
+            <a:cxnLst/>
+            <a:rect l="l" t="t" r="r" b="b"/>
+            <a:pathLst>
+              <a:path w="59991" h="59890" extrusionOk="0">
+                <a:moveTo>
+                  <a:pt x="1" y="0"/>
+                </a:moveTo>
+                <a:cubicBezTo>
+                  <a:pt x="1" y="33019"/>
+                  <a:pt x="26871" y="59889"/>
+                  <a:pt x="59990" y="59889"/>
+                </a:cubicBezTo>
+                <a:lnTo>
+                  <a:pt x="59990" y="22196"/>
+                </a:lnTo>
+                <a:cubicBezTo>
+                  <a:pt x="47717" y="22196"/>
+                  <a:pt x="37819" y="12198"/>
+                  <a:pt x="37819" y="0"/>
+                </a:cubicBezTo>
+                <a:close/>
+              </a:path>
+            </a:pathLst>
+          </a:custGeom>
+          <a:solidFill>
+            <a:schemeClr val="accent2"/>
+          </a:solidFill>
+          <a:ln>
+            <a:noFill/>
+          </a:ln>
+        </p:spPr>
+        <p:txBody>
+          <a:bodyPr spcFirstLastPara="1" wrap="square" lIns="91425" tIns="91425" rIns="91425" bIns="91425" anchor="ctr" anchorCtr="0">
+            <a:noAutofit/>
+          </a:bodyPr>
+          <a:lstStyle/>
+          <a:p>
+            <a:pPr marL="0" lvl="0" indent="0" algn="l" rtl="0">
+              <a:spcBef>
+                <a:spcPts val="0"/>
+              </a:spcBef>
+              <a:spcAft>
+                <a:spcPts val="0"/>
+              </a:spcAft>
+              <a:buNone/>
+            </a:pPr>
+            <a:endParaRPr/>
+          </a:p>
+        </p:txBody>
+      </p:sp>
+      <p:sp>
+        <p:nvSpPr>
+          <p:cNvPr id="62" name="Google Shape;62;p15"/>
+          <p:cNvSpPr/>
+          <p:nvPr/>
+        </p:nvSpPr>
+        <p:spPr>
+          <a:xfrm>
+            <a:off x="2606911" y="1904593"/>
+            <a:ext cx="917697" cy="916167"/>
+          </a:xfrm>
+          <a:custGeom>
+            <a:avLst/>
+            <a:gdLst/>
+            <a:ahLst/>
+            <a:cxnLst/>
+            <a:rect l="l" t="t" r="r" b="b"/>
+            <a:pathLst>
+              <a:path w="59990" h="59890" extrusionOk="0">
+                <a:moveTo>
+                  <a:pt x="22196" y="0"/>
+                </a:moveTo>
+                <a:cubicBezTo>
+                  <a:pt x="22196" y="12198"/>
+                  <a:pt x="12298" y="22196"/>
+                  <a:pt x="0" y="22196"/>
+                </a:cubicBezTo>
+                <a:lnTo>
+                  <a:pt x="0" y="59889"/>
+                </a:lnTo>
+                <a:cubicBezTo>
+                  <a:pt x="33119" y="59889"/>
+                  <a:pt x="59990" y="33019"/>
+                  <a:pt x="59990" y="0"/>
+                </a:cubicBezTo>
+                <a:close/>
+              </a:path>
+            </a:pathLst>
+          </a:custGeom>
+          <a:solidFill>
+            <a:schemeClr val="accent3"/>
+          </a:solidFill>
+          <a:ln>
+            <a:noFill/>
+          </a:ln>
+        </p:spPr>
+        <p:txBody>
+          <a:bodyPr spcFirstLastPara="1" wrap="square" lIns="91425" tIns="91425" rIns="91425" bIns="91425" anchor="ctr" anchorCtr="0">
+            <a:noAutofit/>
+          </a:bodyPr>
+          <a:lstStyle/>
+          <a:p>
+            <a:pPr marL="0" lvl="0" indent="0" algn="l" rtl="0">
+              <a:spcBef>
+                <a:spcPts val="0"/>
+              </a:spcBef>
+              <a:spcAft>
+                <a:spcPts val="0"/>
+              </a:spcAft>
+              <a:buNone/>
+            </a:pPr>
+            <a:endParaRPr/>
+          </a:p>
+        </p:txBody>
+      </p:sp>
+      <p:sp>
+        <p:nvSpPr>
+          <p:cNvPr id="63" name="Google Shape;63;p15"/>
+          <p:cNvSpPr/>
+          <p:nvPr/>
+        </p:nvSpPr>
+        <p:spPr>
+          <a:xfrm flipH="1">
+            <a:off x="3189187" y="3454202"/>
+            <a:ext cx="335413" cy="980442"/>
+          </a:xfrm>
+          <a:custGeom>
+            <a:avLst/>
+            <a:gdLst/>
+            <a:ahLst/>
+            <a:cxnLst/>
+            <a:rect l="l" t="t" r="r" b="b"/>
+            <a:pathLst>
+              <a:path w="2302" h="14545" extrusionOk="0">
+                <a:moveTo>
+                  <a:pt x="0" y="1"/>
+                </a:moveTo>
+                <a:lnTo>
+                  <a:pt x="0" y="14545"/>
+                </a:lnTo>
+                <a:lnTo>
+                  <a:pt x="2302" y="14545"/>
+                </a:lnTo>
+                <a:lnTo>
+                  <a:pt x="2302" y="1"/>
+                </a:lnTo>
+                <a:close/>
+              </a:path>
+            </a:pathLst>
+          </a:custGeom>
+          <a:solidFill>
+            <a:schemeClr val="accent5"/>
+          </a:solidFill>
+          <a:ln>
+            <a:noFill/>
+          </a:ln>
+        </p:spPr>
+        <p:txBody>
+          <a:bodyPr spcFirstLastPara="1" wrap="square" lIns="91425" tIns="91425" rIns="91425" bIns="91425" anchor="ctr" anchorCtr="0">
+            <a:noAutofit/>
+          </a:bodyPr>
+          <a:lstStyle/>
+          <a:p>
+            <a:pPr marL="0" lvl="0" indent="0" algn="l" rtl="0">
+              <a:spcBef>
+                <a:spcPts val="0"/>
+              </a:spcBef>
+              <a:spcAft>
+                <a:spcPts val="0"/>
+              </a:spcAft>
+              <a:buNone/>
+            </a:pPr>
+            <a:endParaRPr/>
+          </a:p>
+        </p:txBody>
+      </p:sp>
+      <p:sp>
+        <p:nvSpPr>
+          <p:cNvPr id="64" name="Google Shape;64;p15"/>
+          <p:cNvSpPr/>
+          <p:nvPr/>
+        </p:nvSpPr>
+        <p:spPr>
+          <a:xfrm flipH="1">
+            <a:off x="2691115" y="3150352"/>
+            <a:ext cx="335415" cy="1284290"/>
+          </a:xfrm>
+          <a:custGeom>
+            <a:avLst/>
+            <a:gdLst/>
+            <a:ahLst/>
+            <a:cxnLst/>
+            <a:rect l="l" t="t" r="r" b="b"/>
+            <a:pathLst>
+              <a:path w="2303" h="15812" extrusionOk="0">
+                <a:moveTo>
+                  <a:pt x="1" y="0"/>
+                </a:moveTo>
+                <a:lnTo>
+                  <a:pt x="1" y="15812"/>
+                </a:lnTo>
+                <a:lnTo>
+                  <a:pt x="2302" y="15812"/>
+                </a:lnTo>
+                <a:lnTo>
+                  <a:pt x="2302" y="0"/>
+                </a:lnTo>
+                <a:close/>
+              </a:path>
+            </a:pathLst>
+          </a:custGeom>
+          <a:solidFill>
+            <a:schemeClr val="accent4"/>
+          </a:solidFill>
+          <a:ln>
+            <a:noFill/>
+          </a:ln>
+        </p:spPr>
+        <p:txBody>
+          <a:bodyPr spcFirstLastPara="1" wrap="square" lIns="91425" tIns="91425" rIns="91425" bIns="91425" anchor="ctr" anchorCtr="0">
+            <a:noAutofit/>
+          </a:bodyPr>
+          <a:lstStyle/>
+          <a:p>
+            <a:pPr marL="0" lvl="0" indent="0" algn="l" rtl="0">
+              <a:spcBef>
+                <a:spcPts val="0"/>
+              </a:spcBef>
+              <a:spcAft>
+                <a:spcPts val="0"/>
+              </a:spcAft>
+              <a:buNone/>
+            </a:pPr>
+            <a:endParaRPr>
+              <a:solidFill>
+                <a:srgbClr val="FF8817"/>
+              </a:solidFill>
+            </a:endParaRPr>
+          </a:p>
+        </p:txBody>
+      </p:sp>
+      <p:sp>
+        <p:nvSpPr>
+          <p:cNvPr id="65" name="Google Shape;65;p15"/>
+          <p:cNvSpPr/>
+          <p:nvPr/>
+        </p:nvSpPr>
+        <p:spPr>
+          <a:xfrm flipH="1">
+            <a:off x="2193061" y="3814799"/>
+            <a:ext cx="335415" cy="617364"/>
+          </a:xfrm>
+          <a:custGeom>
+            <a:avLst/>
+            <a:gdLst/>
+            <a:ahLst/>
+            <a:cxnLst/>
+            <a:rect l="l" t="t" r="r" b="b"/>
+            <a:pathLst>
+              <a:path w="2303" h="11209" extrusionOk="0">
+                <a:moveTo>
+                  <a:pt x="1" y="0"/>
+                </a:moveTo>
+                <a:lnTo>
+                  <a:pt x="1" y="11208"/>
+                </a:lnTo>
+                <a:lnTo>
+                  <a:pt x="2302" y="11208"/>
+                </a:lnTo>
+                <a:lnTo>
+                  <a:pt x="2302" y="0"/>
+                </a:lnTo>
+                <a:close/>
+              </a:path>
+            </a:pathLst>
+          </a:custGeom>
+          <a:solidFill>
+            <a:schemeClr val="accent2"/>
+          </a:solidFill>
+          <a:ln>
+            <a:noFill/>
+          </a:ln>
+        </p:spPr>
+        <p:txBody>
+          <a:bodyPr spcFirstLastPara="1" wrap="square" lIns="91425" tIns="91425" rIns="91425" bIns="91425" anchor="ctr" anchorCtr="0">
+            <a:noAutofit/>
+          </a:bodyPr>
+          <a:lstStyle/>
+          <a:p>
+            <a:pPr marL="0" lvl="0" indent="0" algn="l" rtl="0">
+              <a:spcBef>
+                <a:spcPts val="0"/>
+              </a:spcBef>
+              <a:spcAft>
+                <a:spcPts val="0"/>
+              </a:spcAft>
+              <a:buNone/>
+            </a:pPr>
+            <a:endParaRPr/>
+          </a:p>
+        </p:txBody>
+      </p:sp>
+      <p:sp>
+        <p:nvSpPr>
+          <p:cNvPr id="66" name="Google Shape;66;p15"/>
+          <p:cNvSpPr/>
+          <p:nvPr/>
+        </p:nvSpPr>
+        <p:spPr>
+          <a:xfrm flipH="1">
+            <a:off x="1695000" y="3559980"/>
+            <a:ext cx="335415" cy="874591"/>
+          </a:xfrm>
+          <a:custGeom>
+            <a:avLst/>
+            <a:gdLst/>
+            <a:ahLst/>
+            <a:cxnLst/>
+            <a:rect l="l" t="t" r="r" b="b"/>
+            <a:pathLst>
+              <a:path w="2303" h="14545" extrusionOk="0">
+                <a:moveTo>
+                  <a:pt x="0" y="1"/>
+                </a:moveTo>
+                <a:lnTo>
+                  <a:pt x="0" y="14545"/>
+                </a:lnTo>
+                <a:lnTo>
+                  <a:pt x="2302" y="14545"/>
+                </a:lnTo>
+                <a:lnTo>
+                  <a:pt x="2302" y="1"/>
                 </a:lnTo>
                 <a:close/>
               </a:path>

</xml_diff>